<commit_message>
initial commit of first presentation draft
</commit_message>
<xml_diff>
--- a/final_project/presentation.pptx
+++ b/final_project/presentation.pptx
@@ -3337,7 +3337,7 @@
           <a:p>
             <a:r>
               <a:rPr lang="en-US" sz="2400" dirty="0" smtClean="0"/>
-              <a:t>Used train/test split on a the original 284K transactions</a:t>
+              <a:t>Used train/test split on the original 284K transactions</a:t>
             </a:r>
           </a:p>
         </p:txBody>
@@ -3640,7 +3640,7 @@
           <a:p>
             <a:r>
               <a:rPr lang="en-US" sz="2400" dirty="0" smtClean="0"/>
-              <a:t>Used train/test split on a the original 284K transactions</a:t>
+              <a:t>Used train/test split on the original 284K transactions</a:t>
             </a:r>
           </a:p>
         </p:txBody>
@@ -3757,7 +3757,7 @@
                     <a:p>
                       <a:pPr algn="ctr"/>
                       <a:r>
-                        <a:rPr lang="en-US" smtClean="0"/>
+                        <a:rPr lang="en-US" dirty="0" smtClean="0"/>
                         <a:t>RF Test</a:t>
                       </a:r>
                       <a:endParaRPr lang="en-US" dirty="0"/>
@@ -3975,7 +3975,11 @@
           <a:bodyPr/>
           <a:lstStyle/>
           <a:p>
-            <a:endParaRPr lang="en-US"/>
+            <a:r>
+              <a:rPr lang="en-US" dirty="0" smtClean="0"/>
+              <a:t>Results</a:t>
+            </a:r>
+            <a:endParaRPr lang="en-US" dirty="0"/>
           </a:p>
         </p:txBody>
       </p:sp>
@@ -3991,10 +3995,52 @@
         </p:nvSpPr>
         <p:spPr/>
         <p:txBody>
-          <a:bodyPr/>
+          <a:bodyPr vert="horz" lIns="91440" tIns="45720" rIns="91440" bIns="45720" rtlCol="0">
+            <a:normAutofit/>
+          </a:bodyPr>
           <a:lstStyle/>
           <a:p>
-            <a:endParaRPr lang="en-US"/>
+            <a:r>
+              <a:rPr lang="en-US" sz="2400" dirty="0" smtClean="0"/>
+              <a:t>Simple models are successful in identifying fraudulent activity</a:t>
+            </a:r>
+          </a:p>
+          <a:p>
+            <a:pPr lvl="1"/>
+            <a:r>
+              <a:rPr lang="en-US" sz="2000" dirty="0" smtClean="0"/>
+              <a:t>Low number of base estimators for RF</a:t>
+            </a:r>
+          </a:p>
+          <a:p>
+            <a:pPr lvl="1"/>
+            <a:r>
+              <a:rPr lang="en-US" sz="2000" dirty="0" smtClean="0"/>
+              <a:t>Unnecessary to modify LR threshold</a:t>
+            </a:r>
+          </a:p>
+          <a:p>
+            <a:r>
+              <a:rPr lang="en-US" sz="2400" dirty="0" smtClean="0"/>
+              <a:t>Significant underlying assumptions:</a:t>
+            </a:r>
+          </a:p>
+          <a:p>
+            <a:pPr lvl="1"/>
+            <a:r>
+              <a:rPr lang="en-US" sz="2000" dirty="0" smtClean="0"/>
+              <a:t>Ability to replicate PCA-transform</a:t>
+            </a:r>
+          </a:p>
+          <a:p>
+            <a:pPr lvl="1"/>
+            <a:r>
+              <a:rPr lang="en-US" sz="2000" dirty="0" smtClean="0"/>
+              <a:t>Two-day sample reflective of standard purchasing behaviors (lacks dimension of temporality)</a:t>
+            </a:r>
+          </a:p>
+          <a:p>
+            <a:endParaRPr lang="en-US" sz="2400" dirty="0"/>
           </a:p>
         </p:txBody>
       </p:sp>
@@ -5358,7 +5404,7 @@
           <a:p>
             <a:r>
               <a:rPr lang="en-US" sz="2400" dirty="0" smtClean="0"/>
-              <a:t>Assess model performance using AUROC, TPR, FPR</a:t>
+              <a:t>Assess model performance using AUROC, TPR, FPR in addition to accuracy score</a:t>
             </a:r>
             <a:endParaRPr lang="en-US" sz="2400" dirty="0"/>
           </a:p>

</xml_diff>